<commit_message>
sensor workshop begin 2
</commit_message>
<xml_diff>
--- a/Basic Workshop/Workshop_presentation.pptx
+++ b/Basic Workshop/Workshop_presentation.pptx
@@ -6,19 +6,19 @@
   </p:sldMasterIdLst>
   <p:sldIdLst>
     <p:sldId id="256" r:id="rId2"/>
-    <p:sldId id="265" r:id="rId3"/>
-    <p:sldId id="263" r:id="rId4"/>
-    <p:sldId id="267" r:id="rId5"/>
-    <p:sldId id="257" r:id="rId6"/>
+    <p:sldId id="268" r:id="rId3"/>
+    <p:sldId id="265" r:id="rId4"/>
+    <p:sldId id="263" r:id="rId5"/>
+    <p:sldId id="267" r:id="rId6"/>
     <p:sldId id="266" r:id="rId7"/>
-    <p:sldId id="262" r:id="rId8"/>
-    <p:sldId id="269" r:id="rId9"/>
-    <p:sldId id="258" r:id="rId10"/>
-    <p:sldId id="259" r:id="rId11"/>
-    <p:sldId id="264" r:id="rId12"/>
-    <p:sldId id="261" r:id="rId13"/>
-    <p:sldId id="260" r:id="rId14"/>
-    <p:sldId id="268" r:id="rId15"/>
+    <p:sldId id="257" r:id="rId8"/>
+    <p:sldId id="262" r:id="rId9"/>
+    <p:sldId id="269" r:id="rId10"/>
+    <p:sldId id="258" r:id="rId11"/>
+    <p:sldId id="259" r:id="rId12"/>
+    <p:sldId id="264" r:id="rId13"/>
+    <p:sldId id="261" r:id="rId14"/>
+    <p:sldId id="260" r:id="rId15"/>
   </p:sldIdLst>
   <p:sldSz cx="12192000" cy="6858000"/>
   <p:notesSz cx="6858000" cy="9144000"/>
@@ -3973,7 +3973,7 @@
             <a:fld id="{B61BEF0D-F0BB-DE4B-95CE-6DB70DBA9567}" type="datetimeFigureOut">
               <a:rPr lang="en-US" smtClean="0"/>
               <a:pPr/>
-              <a:t>4/16/2024</a:t>
+              <a:t>4/17/2024</a:t>
             </a:fld>
             <a:endParaRPr lang="en-US" dirty="0"/>
           </a:p>
@@ -4957,7 +4957,7 @@
             <a:fld id="{B61BEF0D-F0BB-DE4B-95CE-6DB70DBA9567}" type="datetimeFigureOut">
               <a:rPr lang="en-US" smtClean="0"/>
               <a:pPr/>
-              <a:t>4/16/2024</a:t>
+              <a:t>4/17/2024</a:t>
             </a:fld>
             <a:endParaRPr lang="en-US" dirty="0"/>
           </a:p>
@@ -5829,7 +5829,7 @@
             <a:fld id="{B61BEF0D-F0BB-DE4B-95CE-6DB70DBA9567}" type="datetimeFigureOut">
               <a:rPr lang="en-US" smtClean="0"/>
               <a:pPr/>
-              <a:t>4/16/2024</a:t>
+              <a:t>4/17/2024</a:t>
             </a:fld>
             <a:endParaRPr lang="en-US" dirty="0"/>
           </a:p>
@@ -6852,7 +6852,7 @@
             <a:fld id="{B61BEF0D-F0BB-DE4B-95CE-6DB70DBA9567}" type="datetimeFigureOut">
               <a:rPr lang="en-US" smtClean="0"/>
               <a:pPr/>
-              <a:t>4/16/2024</a:t>
+              <a:t>4/17/2024</a:t>
             </a:fld>
             <a:endParaRPr lang="en-US" dirty="0"/>
           </a:p>
@@ -7774,7 +7774,7 @@
             <a:fld id="{B61BEF0D-F0BB-DE4B-95CE-6DB70DBA9567}" type="datetimeFigureOut">
               <a:rPr lang="en-US" smtClean="0"/>
               <a:pPr/>
-              <a:t>4/16/2024</a:t>
+              <a:t>4/17/2024</a:t>
             </a:fld>
             <a:endParaRPr lang="en-US" dirty="0"/>
           </a:p>
@@ -8432,7 +8432,7 @@
             <a:fld id="{B61BEF0D-F0BB-DE4B-95CE-6DB70DBA9567}" type="datetimeFigureOut">
               <a:rPr lang="en-US" smtClean="0"/>
               <a:pPr/>
-              <a:t>4/16/2024</a:t>
+              <a:t>4/17/2024</a:t>
             </a:fld>
             <a:endParaRPr lang="en-US" dirty="0"/>
           </a:p>
@@ -9291,7 +9291,7 @@
             <a:fld id="{B61BEF0D-F0BB-DE4B-95CE-6DB70DBA9567}" type="datetimeFigureOut">
               <a:rPr lang="en-US" smtClean="0"/>
               <a:pPr/>
-              <a:t>4/16/2024</a:t>
+              <a:t>4/17/2024</a:t>
             </a:fld>
             <a:endParaRPr lang="en-US" dirty="0"/>
           </a:p>
@@ -9476,7 +9476,7 @@
             <a:fld id="{B61BEF0D-F0BB-DE4B-95CE-6DB70DBA9567}" type="datetimeFigureOut">
               <a:rPr lang="en-US" smtClean="0"/>
               <a:pPr/>
-              <a:t>4/16/2024</a:t>
+              <a:t>4/17/2024</a:t>
             </a:fld>
             <a:endParaRPr lang="en-US" dirty="0"/>
           </a:p>
@@ -10335,7 +10335,7 @@
             <a:fld id="{B61BEF0D-F0BB-DE4B-95CE-6DB70DBA9567}" type="datetimeFigureOut">
               <a:rPr lang="en-US" smtClean="0"/>
               <a:pPr/>
-              <a:t>4/16/2024</a:t>
+              <a:t>4/17/2024</a:t>
             </a:fld>
             <a:endParaRPr lang="en-US" dirty="0"/>
           </a:p>
@@ -10562,7 +10562,7 @@
             <a:fld id="{B61BEF0D-F0BB-DE4B-95CE-6DB70DBA9567}" type="datetimeFigureOut">
               <a:rPr lang="en-US" smtClean="0"/>
               <a:pPr/>
-              <a:t>4/16/2024</a:t>
+              <a:t>4/17/2024</a:t>
             </a:fld>
             <a:endParaRPr lang="en-US" dirty="0"/>
           </a:p>
@@ -11489,7 +11489,7 @@
             <a:fld id="{B61BEF0D-F0BB-DE4B-95CE-6DB70DBA9567}" type="datetimeFigureOut">
               <a:rPr lang="en-US" smtClean="0"/>
               <a:pPr/>
-              <a:t>4/16/2024</a:t>
+              <a:t>4/17/2024</a:t>
             </a:fld>
             <a:endParaRPr lang="en-US" dirty="0"/>
           </a:p>
@@ -11775,7 +11775,7 @@
             <a:fld id="{B61BEF0D-F0BB-DE4B-95CE-6DB70DBA9567}" type="datetimeFigureOut">
               <a:rPr lang="en-US" smtClean="0"/>
               <a:pPr/>
-              <a:t>4/16/2024</a:t>
+              <a:t>4/17/2024</a:t>
             </a:fld>
             <a:endParaRPr lang="en-US" dirty="0"/>
           </a:p>
@@ -12167,7 +12167,7 @@
             <a:fld id="{B61BEF0D-F0BB-DE4B-95CE-6DB70DBA9567}" type="datetimeFigureOut">
               <a:rPr lang="en-US" smtClean="0"/>
               <a:pPr/>
-              <a:t>4/16/2024</a:t>
+              <a:t>4/17/2024</a:t>
             </a:fld>
             <a:endParaRPr lang="en-US" dirty="0"/>
           </a:p>
@@ -12295,7 +12295,7 @@
             <a:fld id="{B61BEF0D-F0BB-DE4B-95CE-6DB70DBA9567}" type="datetimeFigureOut">
               <a:rPr lang="en-US" smtClean="0"/>
               <a:pPr/>
-              <a:t>4/16/2024</a:t>
+              <a:t>4/17/2024</a:t>
             </a:fld>
             <a:endParaRPr lang="en-US" dirty="0"/>
           </a:p>
@@ -12392,7 +12392,7 @@
             <a:fld id="{B61BEF0D-F0BB-DE4B-95CE-6DB70DBA9567}" type="datetimeFigureOut">
               <a:rPr lang="en-US" smtClean="0"/>
               <a:pPr/>
-              <a:t>4/16/2024</a:t>
+              <a:t>4/17/2024</a:t>
             </a:fld>
             <a:endParaRPr lang="en-US" dirty="0"/>
           </a:p>
@@ -13365,7 +13365,7 @@
             <a:fld id="{B61BEF0D-F0BB-DE4B-95CE-6DB70DBA9567}" type="datetimeFigureOut">
               <a:rPr lang="en-US" smtClean="0"/>
               <a:pPr/>
-              <a:t>4/16/2024</a:t>
+              <a:t>4/17/2024</a:t>
             </a:fld>
             <a:endParaRPr lang="en-US" dirty="0"/>
           </a:p>
@@ -14362,7 +14362,7 @@
             <a:fld id="{B61BEF0D-F0BB-DE4B-95CE-6DB70DBA9567}" type="datetimeFigureOut">
               <a:rPr lang="en-US" smtClean="0"/>
               <a:pPr/>
-              <a:t>4/16/2024</a:t>
+              <a:t>4/17/2024</a:t>
             </a:fld>
             <a:endParaRPr lang="en-US" dirty="0"/>
           </a:p>
@@ -15248,7 +15248,7 @@
             <a:fld id="{B61BEF0D-F0BB-DE4B-95CE-6DB70DBA9567}" type="datetimeFigureOut">
               <a:rPr lang="en-US" smtClean="0"/>
               <a:pPr/>
-              <a:t>4/16/2024</a:t>
+              <a:t>4/17/2024</a:t>
             </a:fld>
             <a:endParaRPr lang="en-US" dirty="0"/>
           </a:p>
@@ -16500,6 +16500,147 @@
       </p:grpSpPr>
       <p:sp>
         <p:nvSpPr>
+          <p:cNvPr id="2" name="Title 1">
+            <a:extLst>
+              <a:ext uri="{FF2B5EF4-FFF2-40B4-BE49-F238E27FC236}">
+                <a16:creationId xmlns:a16="http://schemas.microsoft.com/office/drawing/2014/main" id="{1456509C-DE2D-E29A-0641-3ADFB676E85C}"/>
+              </a:ext>
+            </a:extLst>
+          </p:cNvPr>
+          <p:cNvSpPr>
+            <a:spLocks noGrp="1"/>
+          </p:cNvSpPr>
+          <p:nvPr>
+            <p:ph type="title"/>
+          </p:nvPr>
+        </p:nvSpPr>
+        <p:spPr>
+          <a:xfrm>
+            <a:off x="1154954" y="973669"/>
+            <a:ext cx="8825659" cy="706964"/>
+          </a:xfrm>
+        </p:spPr>
+        <p:txBody>
+          <a:bodyPr>
+            <a:normAutofit/>
+          </a:bodyPr>
+          <a:lstStyle/>
+          <a:p>
+            <a:r>
+              <a:rPr lang="en-GB" dirty="0"/>
+              <a:t>Git repository for these workshops</a:t>
+            </a:r>
+          </a:p>
+        </p:txBody>
+      </p:sp>
+      <p:sp>
+        <p:nvSpPr>
+          <p:cNvPr id="3" name="Content Placeholder 2">
+            <a:extLst>
+              <a:ext uri="{FF2B5EF4-FFF2-40B4-BE49-F238E27FC236}">
+                <a16:creationId xmlns:a16="http://schemas.microsoft.com/office/drawing/2014/main" id="{81E36EF8-C069-FFA9-CB2B-B4827089AB45}"/>
+              </a:ext>
+            </a:extLst>
+          </p:cNvPr>
+          <p:cNvSpPr>
+            <a:spLocks noGrp="1"/>
+          </p:cNvSpPr>
+          <p:nvPr>
+            <p:ph idx="1"/>
+          </p:nvPr>
+        </p:nvSpPr>
+        <p:spPr>
+          <a:xfrm>
+            <a:off x="5980954" y="2603500"/>
+            <a:ext cx="5211979" cy="3416300"/>
+          </a:xfrm>
+        </p:spPr>
+        <p:txBody>
+          <a:bodyPr anchor="ctr">
+            <a:normAutofit/>
+          </a:bodyPr>
+          <a:lstStyle/>
+          <a:p>
+            <a:r>
+              <a:rPr lang="en-GB" dirty="0"/>
+              <a:t>https://github.com/Rauleal/TouchDesigner_Bauhaus_workshop</a:t>
+            </a:r>
+          </a:p>
+          <a:p>
+            <a:endParaRPr lang="en-GB" dirty="0"/>
+          </a:p>
+        </p:txBody>
+      </p:sp>
+      <p:pic>
+        <p:nvPicPr>
+          <p:cNvPr id="6" name="Picture 5" descr="A qr code on a white background&#10;&#10;Description automatically generated">
+            <a:extLst>
+              <a:ext uri="{FF2B5EF4-FFF2-40B4-BE49-F238E27FC236}">
+                <a16:creationId xmlns:a16="http://schemas.microsoft.com/office/drawing/2014/main" id="{7F3F36FB-32F6-47C0-4108-C5CB112991F6}"/>
+              </a:ext>
+            </a:extLst>
+          </p:cNvPr>
+          <p:cNvPicPr>
+            <a:picLocks noChangeAspect="1"/>
+          </p:cNvPicPr>
+          <p:nvPr/>
+        </p:nvPicPr>
+        <p:blipFill>
+          <a:blip r:embed="rId2"/>
+          <a:stretch>
+            <a:fillRect/>
+          </a:stretch>
+        </p:blipFill>
+        <p:spPr>
+          <a:xfrm>
+            <a:off x="1660570" y="2696005"/>
+            <a:ext cx="3188326" cy="3188326"/>
+          </a:xfrm>
+          <a:prstGeom prst="rect">
+            <a:avLst/>
+          </a:prstGeom>
+        </p:spPr>
+      </p:pic>
+    </p:spTree>
+    <p:extLst>
+      <p:ext uri="{BB962C8B-B14F-4D97-AF65-F5344CB8AC3E}">
+        <p14:creationId xmlns:p14="http://schemas.microsoft.com/office/powerpoint/2010/main" val="22761770"/>
+      </p:ext>
+    </p:extLst>
+  </p:cSld>
+  <p:clrMapOvr>
+    <a:masterClrMapping/>
+  </p:clrMapOvr>
+</p:sld>
+</file>
+
+<file path=ppt/slides/slide11.xml><?xml version="1.0" encoding="utf-8"?>
+<p:sld xmlns:a="http://schemas.openxmlformats.org/drawingml/2006/main" xmlns:r="http://schemas.openxmlformats.org/officeDocument/2006/relationships" xmlns:p="http://schemas.openxmlformats.org/presentationml/2006/main">
+  <p:cSld>
+    <p:bg>
+      <p:bgPr>
+        <a:solidFill>
+          <a:schemeClr val="bg1"/>
+        </a:solidFill>
+        <a:effectLst/>
+      </p:bgPr>
+    </p:bg>
+    <p:spTree>
+      <p:nvGrpSpPr>
+        <p:cNvPr id="1" name=""/>
+        <p:cNvGrpSpPr/>
+        <p:nvPr/>
+      </p:nvGrpSpPr>
+      <p:grpSpPr>
+        <a:xfrm>
+          <a:off x="0" y="0"/>
+          <a:ext cx="0" cy="0"/>
+          <a:chOff x="0" y="0"/>
+          <a:chExt cx="0" cy="0"/>
+        </a:xfrm>
+      </p:grpSpPr>
+      <p:sp>
+        <p:nvSpPr>
           <p:cNvPr id="12" name="Rectangle 11">
             <a:extLst>
               <a:ext uri="{FF2B5EF4-FFF2-40B4-BE49-F238E27FC236}">
@@ -17600,7 +17741,7 @@
 </p:sld>
 </file>
 
-<file path=ppt/slides/slide11.xml><?xml version="1.0" encoding="utf-8"?>
+<file path=ppt/slides/slide12.xml><?xml version="1.0" encoding="utf-8"?>
 <p:sld xmlns:a="http://schemas.openxmlformats.org/drawingml/2006/main" xmlns:r="http://schemas.openxmlformats.org/officeDocument/2006/relationships" xmlns:p="http://schemas.openxmlformats.org/presentationml/2006/main">
   <p:cSld>
     <p:bg>
@@ -18774,7 +18915,7 @@
 </p:sld>
 </file>
 
-<file path=ppt/slides/slide12.xml><?xml version="1.0" encoding="utf-8"?>
+<file path=ppt/slides/slide13.xml><?xml version="1.0" encoding="utf-8"?>
 <p:sld xmlns:a="http://schemas.openxmlformats.org/drawingml/2006/main" xmlns:r="http://schemas.openxmlformats.org/officeDocument/2006/relationships" xmlns:p="http://schemas.openxmlformats.org/presentationml/2006/main">
   <p:cSld>
     <p:bg>
@@ -19857,7 +19998,7 @@
 </p:sld>
 </file>
 
-<file path=ppt/slides/slide13.xml><?xml version="1.0" encoding="utf-8"?>
+<file path=ppt/slides/slide14.xml><?xml version="1.0" encoding="utf-8"?>
 <p:sld xmlns:a="http://schemas.openxmlformats.org/drawingml/2006/main" xmlns:r="http://schemas.openxmlformats.org/officeDocument/2006/relationships" xmlns:p="http://schemas.openxmlformats.org/presentationml/2006/main">
   <p:cSld>
     <p:spTree>
@@ -22390,7 +22531,7 @@
 </p:sld>
 </file>
 
-<file path=ppt/slides/slide14.xml><?xml version="1.0" encoding="utf-8"?>
+<file path=ppt/slides/slide2.xml><?xml version="1.0" encoding="utf-8"?>
 <p:sld xmlns:a="http://schemas.openxmlformats.org/drawingml/2006/main" xmlns:r="http://schemas.openxmlformats.org/officeDocument/2006/relationships" xmlns:p="http://schemas.openxmlformats.org/presentationml/2006/main">
   <p:cSld>
     <p:spTree>
@@ -22516,7 +22657,7 @@
 </p:sld>
 </file>
 
-<file path=ppt/slides/slide2.xml><?xml version="1.0" encoding="utf-8"?>
+<file path=ppt/slides/slide3.xml><?xml version="1.0" encoding="utf-8"?>
 <p:sld xmlns:a="http://schemas.openxmlformats.org/drawingml/2006/main" xmlns:r="http://schemas.openxmlformats.org/officeDocument/2006/relationships" xmlns:p="http://schemas.openxmlformats.org/presentationml/2006/main">
   <p:cSld>
     <p:spTree>
@@ -22598,7 +22739,7 @@
 </p:sld>
 </file>
 
-<file path=ppt/slides/slide3.xml><?xml version="1.0" encoding="utf-8"?>
+<file path=ppt/slides/slide4.xml><?xml version="1.0" encoding="utf-8"?>
 <p:sld xmlns:a="http://schemas.openxmlformats.org/drawingml/2006/main" xmlns:r="http://schemas.openxmlformats.org/officeDocument/2006/relationships" xmlns:p="http://schemas.openxmlformats.org/presentationml/2006/main">
   <p:cSld>
     <p:bg>
@@ -23672,7 +23813,7 @@
 </p:sld>
 </file>
 
-<file path=ppt/slides/slide4.xml><?xml version="1.0" encoding="utf-8"?>
+<file path=ppt/slides/slide5.xml><?xml version="1.0" encoding="utf-8"?>
 <p:sld xmlns:a="http://schemas.openxmlformats.org/drawingml/2006/main" xmlns:r="http://schemas.openxmlformats.org/officeDocument/2006/relationships" xmlns:p="http://schemas.openxmlformats.org/presentationml/2006/main">
   <p:cSld>
     <p:spTree>
@@ -23896,7 +24037,245 @@
 </p:sld>
 </file>
 
-<file path=ppt/slides/slide5.xml><?xml version="1.0" encoding="utf-8"?>
+<file path=ppt/slides/slide6.xml><?xml version="1.0" encoding="utf-8"?>
+<p:sld xmlns:a="http://schemas.openxmlformats.org/drawingml/2006/main" xmlns:r="http://schemas.openxmlformats.org/officeDocument/2006/relationships" xmlns:p="http://schemas.openxmlformats.org/presentationml/2006/main">
+  <p:cSld>
+    <p:spTree>
+      <p:nvGrpSpPr>
+        <p:cNvPr id="1" name=""/>
+        <p:cNvGrpSpPr/>
+        <p:nvPr/>
+      </p:nvGrpSpPr>
+      <p:grpSpPr>
+        <a:xfrm>
+          <a:off x="0" y="0"/>
+          <a:ext cx="0" cy="0"/>
+          <a:chOff x="0" y="0"/>
+          <a:chExt cx="0" cy="0"/>
+        </a:xfrm>
+      </p:grpSpPr>
+      <p:sp>
+        <p:nvSpPr>
+          <p:cNvPr id="2" name="Title 1">
+            <a:extLst>
+              <a:ext uri="{FF2B5EF4-FFF2-40B4-BE49-F238E27FC236}">
+                <a16:creationId xmlns:a16="http://schemas.microsoft.com/office/drawing/2014/main" id="{19289193-0674-CABB-0946-E855EFAF68E2}"/>
+              </a:ext>
+            </a:extLst>
+          </p:cNvPr>
+          <p:cNvSpPr>
+            <a:spLocks noGrp="1"/>
+          </p:cNvSpPr>
+          <p:nvPr>
+            <p:ph type="title"/>
+          </p:nvPr>
+        </p:nvSpPr>
+        <p:spPr/>
+        <p:txBody>
+          <a:bodyPr/>
+          <a:lstStyle/>
+          <a:p>
+            <a:r>
+              <a:rPr lang="en-US" dirty="0"/>
+              <a:t>The workshop structure</a:t>
+            </a:r>
+            <a:endParaRPr lang="en-NL" dirty="0"/>
+          </a:p>
+        </p:txBody>
+      </p:sp>
+      <p:graphicFrame>
+        <p:nvGraphicFramePr>
+          <p:cNvPr id="4" name="Content Placeholder 3">
+            <a:extLst>
+              <a:ext uri="{FF2B5EF4-FFF2-40B4-BE49-F238E27FC236}">
+                <a16:creationId xmlns:a16="http://schemas.microsoft.com/office/drawing/2014/main" id="{EFB929B2-5502-AD5F-7116-5550D6EE9EF9}"/>
+              </a:ext>
+            </a:extLst>
+          </p:cNvPr>
+          <p:cNvGraphicFramePr>
+            <a:graphicFrameLocks noGrp="1"/>
+          </p:cNvGraphicFramePr>
+          <p:nvPr>
+            <p:ph idx="1"/>
+            <p:extLst>
+              <p:ext uri="{D42A27DB-BD31-4B8C-83A1-F6EECF244321}">
+                <p14:modId xmlns:p14="http://schemas.microsoft.com/office/powerpoint/2010/main" val="4210683065"/>
+              </p:ext>
+            </p:extLst>
+          </p:nvPr>
+        </p:nvGraphicFramePr>
+        <p:xfrm>
+          <a:off x="1154954" y="2603500"/>
+          <a:ext cx="8825659" cy="3416300"/>
+        </p:xfrm>
+        <a:graphic>
+          <a:graphicData uri="http://schemas.openxmlformats.org/drawingml/2006/diagram">
+            <dgm:relIds xmlns:dgm="http://schemas.openxmlformats.org/drawingml/2006/diagram" xmlns:r="http://schemas.openxmlformats.org/officeDocument/2006/relationships" r:dm="rId2" r:lo="rId3" r:qs="rId4" r:cs="rId5"/>
+          </a:graphicData>
+        </a:graphic>
+      </p:graphicFrame>
+      <p:pic>
+        <p:nvPicPr>
+          <p:cNvPr id="6" name="Graphic 5" descr="Coffee with solid fill">
+            <a:extLst>
+              <a:ext uri="{FF2B5EF4-FFF2-40B4-BE49-F238E27FC236}">
+                <a16:creationId xmlns:a16="http://schemas.microsoft.com/office/drawing/2014/main" id="{8F0EC820-71D8-3915-30F6-CEE96FD9F7BD}"/>
+              </a:ext>
+            </a:extLst>
+          </p:cNvPr>
+          <p:cNvPicPr>
+            <a:picLocks noChangeAspect="1"/>
+          </p:cNvPicPr>
+          <p:nvPr/>
+        </p:nvPicPr>
+        <p:blipFill>
+          <a:blip r:embed="rId7">
+            <a:extLst>
+              <a:ext uri="{96DAC541-7B7A-43D3-8B79-37D633B846F1}">
+                <asvg:svgBlip xmlns:asvg="http://schemas.microsoft.com/office/drawing/2016/SVG/main" r:embed="rId8"/>
+              </a:ext>
+            </a:extLst>
+          </a:blip>
+          <a:stretch>
+            <a:fillRect/>
+          </a:stretch>
+        </p:blipFill>
+        <p:spPr>
+          <a:xfrm>
+            <a:off x="4855840" y="3577015"/>
+            <a:ext cx="646058" cy="646058"/>
+          </a:xfrm>
+          <a:prstGeom prst="rect">
+            <a:avLst/>
+          </a:prstGeom>
+        </p:spPr>
+      </p:pic>
+      <p:pic>
+        <p:nvPicPr>
+          <p:cNvPr id="7" name="Graphic 6" descr="Coffee with solid fill">
+            <a:extLst>
+              <a:ext uri="{FF2B5EF4-FFF2-40B4-BE49-F238E27FC236}">
+                <a16:creationId xmlns:a16="http://schemas.microsoft.com/office/drawing/2014/main" id="{2A6A28A7-1A59-10C9-2FF9-FE8F40CA65E9}"/>
+              </a:ext>
+            </a:extLst>
+          </p:cNvPr>
+          <p:cNvPicPr>
+            <a:picLocks noChangeAspect="1"/>
+          </p:cNvPicPr>
+          <p:nvPr/>
+        </p:nvPicPr>
+        <p:blipFill>
+          <a:blip r:embed="rId7">
+            <a:extLst>
+              <a:ext uri="{96DAC541-7B7A-43D3-8B79-37D633B846F1}">
+                <asvg:svgBlip xmlns:asvg="http://schemas.microsoft.com/office/drawing/2016/SVG/main" r:embed="rId8"/>
+              </a:ext>
+            </a:extLst>
+          </a:blip>
+          <a:stretch>
+            <a:fillRect/>
+          </a:stretch>
+        </p:blipFill>
+        <p:spPr>
+          <a:xfrm>
+            <a:off x="6155115" y="3577015"/>
+            <a:ext cx="646058" cy="646058"/>
+          </a:xfrm>
+          <a:prstGeom prst="rect">
+            <a:avLst/>
+          </a:prstGeom>
+        </p:spPr>
+      </p:pic>
+      <p:sp>
+        <p:nvSpPr>
+          <p:cNvPr id="8" name="Rectangle 7">
+            <a:extLst>
+              <a:ext uri="{FF2B5EF4-FFF2-40B4-BE49-F238E27FC236}">
+                <a16:creationId xmlns:a16="http://schemas.microsoft.com/office/drawing/2014/main" id="{ED489B3F-AE92-9399-2684-6B6E0D5B19AB}"/>
+              </a:ext>
+            </a:extLst>
+          </p:cNvPr>
+          <p:cNvSpPr/>
+          <p:nvPr/>
+        </p:nvSpPr>
+        <p:spPr>
+          <a:xfrm>
+            <a:off x="7768471" y="2698124"/>
+            <a:ext cx="2631220" cy="3263721"/>
+          </a:xfrm>
+          <a:prstGeom prst="rect">
+            <a:avLst/>
+          </a:prstGeom>
+          <a:solidFill>
+            <a:schemeClr val="tx1">
+              <a:alpha val="40000"/>
+            </a:schemeClr>
+          </a:solidFill>
+          <a:ln>
+            <a:noFill/>
+          </a:ln>
+        </p:spPr>
+        <p:style>
+          <a:lnRef idx="2">
+            <a:schemeClr val="accent1">
+              <a:shade val="15000"/>
+            </a:schemeClr>
+          </a:lnRef>
+          <a:fillRef idx="1">
+            <a:schemeClr val="accent1"/>
+          </a:fillRef>
+          <a:effectRef idx="0">
+            <a:schemeClr val="accent1"/>
+          </a:effectRef>
+          <a:fontRef idx="minor">
+            <a:schemeClr val="lt1"/>
+          </a:fontRef>
+        </p:style>
+        <p:txBody>
+          <a:bodyPr rtlCol="0" anchor="t"/>
+          <a:lstStyle/>
+          <a:p>
+            <a:pPr algn="ctr"/>
+            <a:r>
+              <a:rPr lang="en-US" dirty="0">
+                <a:solidFill>
+                  <a:schemeClr val="tx1"/>
+                </a:solidFill>
+              </a:rPr>
+              <a:t>Next </a:t>
+            </a:r>
+            <a:r>
+              <a:rPr lang="en-US" dirty="0">
+                <a:solidFill>
+                  <a:schemeClr val="tx1"/>
+                </a:solidFill>
+                <a:latin typeface="ITC Avant Garde Pro Bk" panose="020B0502020202020204" pitchFamily="34" charset="0"/>
+              </a:rPr>
+              <a:t>Workshop</a:t>
+            </a:r>
+            <a:endParaRPr lang="en-NL" dirty="0">
+              <a:solidFill>
+                <a:schemeClr val="tx1"/>
+              </a:solidFill>
+              <a:latin typeface="ITC Avant Garde Pro Bk" panose="020B0502020202020204" pitchFamily="34" charset="0"/>
+            </a:endParaRPr>
+          </a:p>
+        </p:txBody>
+      </p:sp>
+    </p:spTree>
+    <p:extLst>
+      <p:ext uri="{BB962C8B-B14F-4D97-AF65-F5344CB8AC3E}">
+        <p14:creationId xmlns:p14="http://schemas.microsoft.com/office/powerpoint/2010/main" val="1216353968"/>
+      </p:ext>
+    </p:extLst>
+  </p:cSld>
+  <p:clrMapOvr>
+    <a:masterClrMapping/>
+  </p:clrMapOvr>
+</p:sld>
+</file>
+
+<file path=ppt/slides/slide7.xml><?xml version="1.0" encoding="utf-8"?>
 <p:sld xmlns:a="http://schemas.openxmlformats.org/drawingml/2006/main" xmlns:r="http://schemas.openxmlformats.org/officeDocument/2006/relationships" xmlns:p="http://schemas.openxmlformats.org/presentationml/2006/main">
   <p:cSld>
     <p:spTree>
@@ -24602,245 +24981,7 @@
 </p:sld>
 </file>
 
-<file path=ppt/slides/slide6.xml><?xml version="1.0" encoding="utf-8"?>
-<p:sld xmlns:a="http://schemas.openxmlformats.org/drawingml/2006/main" xmlns:r="http://schemas.openxmlformats.org/officeDocument/2006/relationships" xmlns:p="http://schemas.openxmlformats.org/presentationml/2006/main">
-  <p:cSld>
-    <p:spTree>
-      <p:nvGrpSpPr>
-        <p:cNvPr id="1" name=""/>
-        <p:cNvGrpSpPr/>
-        <p:nvPr/>
-      </p:nvGrpSpPr>
-      <p:grpSpPr>
-        <a:xfrm>
-          <a:off x="0" y="0"/>
-          <a:ext cx="0" cy="0"/>
-          <a:chOff x="0" y="0"/>
-          <a:chExt cx="0" cy="0"/>
-        </a:xfrm>
-      </p:grpSpPr>
-      <p:sp>
-        <p:nvSpPr>
-          <p:cNvPr id="2" name="Title 1">
-            <a:extLst>
-              <a:ext uri="{FF2B5EF4-FFF2-40B4-BE49-F238E27FC236}">
-                <a16:creationId xmlns:a16="http://schemas.microsoft.com/office/drawing/2014/main" id="{19289193-0674-CABB-0946-E855EFAF68E2}"/>
-              </a:ext>
-            </a:extLst>
-          </p:cNvPr>
-          <p:cNvSpPr>
-            <a:spLocks noGrp="1"/>
-          </p:cNvSpPr>
-          <p:nvPr>
-            <p:ph type="title"/>
-          </p:nvPr>
-        </p:nvSpPr>
-        <p:spPr/>
-        <p:txBody>
-          <a:bodyPr/>
-          <a:lstStyle/>
-          <a:p>
-            <a:r>
-              <a:rPr lang="en-US" dirty="0"/>
-              <a:t>The workshop structure</a:t>
-            </a:r>
-            <a:endParaRPr lang="en-NL" dirty="0"/>
-          </a:p>
-        </p:txBody>
-      </p:sp>
-      <p:graphicFrame>
-        <p:nvGraphicFramePr>
-          <p:cNvPr id="4" name="Content Placeholder 3">
-            <a:extLst>
-              <a:ext uri="{FF2B5EF4-FFF2-40B4-BE49-F238E27FC236}">
-                <a16:creationId xmlns:a16="http://schemas.microsoft.com/office/drawing/2014/main" id="{EFB929B2-5502-AD5F-7116-5550D6EE9EF9}"/>
-              </a:ext>
-            </a:extLst>
-          </p:cNvPr>
-          <p:cNvGraphicFramePr>
-            <a:graphicFrameLocks noGrp="1"/>
-          </p:cNvGraphicFramePr>
-          <p:nvPr>
-            <p:ph idx="1"/>
-            <p:extLst>
-              <p:ext uri="{D42A27DB-BD31-4B8C-83A1-F6EECF244321}">
-                <p14:modId xmlns:p14="http://schemas.microsoft.com/office/powerpoint/2010/main" val="4210683065"/>
-              </p:ext>
-            </p:extLst>
-          </p:nvPr>
-        </p:nvGraphicFramePr>
-        <p:xfrm>
-          <a:off x="1154954" y="2603500"/>
-          <a:ext cx="8825659" cy="3416300"/>
-        </p:xfrm>
-        <a:graphic>
-          <a:graphicData uri="http://schemas.openxmlformats.org/drawingml/2006/diagram">
-            <dgm:relIds xmlns:dgm="http://schemas.openxmlformats.org/drawingml/2006/diagram" xmlns:r="http://schemas.openxmlformats.org/officeDocument/2006/relationships" r:dm="rId2" r:lo="rId3" r:qs="rId4" r:cs="rId5"/>
-          </a:graphicData>
-        </a:graphic>
-      </p:graphicFrame>
-      <p:pic>
-        <p:nvPicPr>
-          <p:cNvPr id="6" name="Graphic 5" descr="Coffee with solid fill">
-            <a:extLst>
-              <a:ext uri="{FF2B5EF4-FFF2-40B4-BE49-F238E27FC236}">
-                <a16:creationId xmlns:a16="http://schemas.microsoft.com/office/drawing/2014/main" id="{8F0EC820-71D8-3915-30F6-CEE96FD9F7BD}"/>
-              </a:ext>
-            </a:extLst>
-          </p:cNvPr>
-          <p:cNvPicPr>
-            <a:picLocks noChangeAspect="1"/>
-          </p:cNvPicPr>
-          <p:nvPr/>
-        </p:nvPicPr>
-        <p:blipFill>
-          <a:blip r:embed="rId7">
-            <a:extLst>
-              <a:ext uri="{96DAC541-7B7A-43D3-8B79-37D633B846F1}">
-                <asvg:svgBlip xmlns:asvg="http://schemas.microsoft.com/office/drawing/2016/SVG/main" r:embed="rId8"/>
-              </a:ext>
-            </a:extLst>
-          </a:blip>
-          <a:stretch>
-            <a:fillRect/>
-          </a:stretch>
-        </p:blipFill>
-        <p:spPr>
-          <a:xfrm>
-            <a:off x="4855840" y="3577015"/>
-            <a:ext cx="646058" cy="646058"/>
-          </a:xfrm>
-          <a:prstGeom prst="rect">
-            <a:avLst/>
-          </a:prstGeom>
-        </p:spPr>
-      </p:pic>
-      <p:pic>
-        <p:nvPicPr>
-          <p:cNvPr id="7" name="Graphic 6" descr="Coffee with solid fill">
-            <a:extLst>
-              <a:ext uri="{FF2B5EF4-FFF2-40B4-BE49-F238E27FC236}">
-                <a16:creationId xmlns:a16="http://schemas.microsoft.com/office/drawing/2014/main" id="{2A6A28A7-1A59-10C9-2FF9-FE8F40CA65E9}"/>
-              </a:ext>
-            </a:extLst>
-          </p:cNvPr>
-          <p:cNvPicPr>
-            <a:picLocks noChangeAspect="1"/>
-          </p:cNvPicPr>
-          <p:nvPr/>
-        </p:nvPicPr>
-        <p:blipFill>
-          <a:blip r:embed="rId7">
-            <a:extLst>
-              <a:ext uri="{96DAC541-7B7A-43D3-8B79-37D633B846F1}">
-                <asvg:svgBlip xmlns:asvg="http://schemas.microsoft.com/office/drawing/2016/SVG/main" r:embed="rId8"/>
-              </a:ext>
-            </a:extLst>
-          </a:blip>
-          <a:stretch>
-            <a:fillRect/>
-          </a:stretch>
-        </p:blipFill>
-        <p:spPr>
-          <a:xfrm>
-            <a:off x="6155115" y="3577015"/>
-            <a:ext cx="646058" cy="646058"/>
-          </a:xfrm>
-          <a:prstGeom prst="rect">
-            <a:avLst/>
-          </a:prstGeom>
-        </p:spPr>
-      </p:pic>
-      <p:sp>
-        <p:nvSpPr>
-          <p:cNvPr id="8" name="Rectangle 7">
-            <a:extLst>
-              <a:ext uri="{FF2B5EF4-FFF2-40B4-BE49-F238E27FC236}">
-                <a16:creationId xmlns:a16="http://schemas.microsoft.com/office/drawing/2014/main" id="{ED489B3F-AE92-9399-2684-6B6E0D5B19AB}"/>
-              </a:ext>
-            </a:extLst>
-          </p:cNvPr>
-          <p:cNvSpPr/>
-          <p:nvPr/>
-        </p:nvSpPr>
-        <p:spPr>
-          <a:xfrm>
-            <a:off x="7768471" y="2698124"/>
-            <a:ext cx="2631220" cy="3263721"/>
-          </a:xfrm>
-          <a:prstGeom prst="rect">
-            <a:avLst/>
-          </a:prstGeom>
-          <a:solidFill>
-            <a:schemeClr val="tx1">
-              <a:alpha val="40000"/>
-            </a:schemeClr>
-          </a:solidFill>
-          <a:ln>
-            <a:noFill/>
-          </a:ln>
-        </p:spPr>
-        <p:style>
-          <a:lnRef idx="2">
-            <a:schemeClr val="accent1">
-              <a:shade val="15000"/>
-            </a:schemeClr>
-          </a:lnRef>
-          <a:fillRef idx="1">
-            <a:schemeClr val="accent1"/>
-          </a:fillRef>
-          <a:effectRef idx="0">
-            <a:schemeClr val="accent1"/>
-          </a:effectRef>
-          <a:fontRef idx="minor">
-            <a:schemeClr val="lt1"/>
-          </a:fontRef>
-        </p:style>
-        <p:txBody>
-          <a:bodyPr rtlCol="0" anchor="t"/>
-          <a:lstStyle/>
-          <a:p>
-            <a:pPr algn="ctr"/>
-            <a:r>
-              <a:rPr lang="en-US" dirty="0">
-                <a:solidFill>
-                  <a:schemeClr val="tx1"/>
-                </a:solidFill>
-              </a:rPr>
-              <a:t>Next </a:t>
-            </a:r>
-            <a:r>
-              <a:rPr lang="en-US" dirty="0">
-                <a:solidFill>
-                  <a:schemeClr val="tx1"/>
-                </a:solidFill>
-                <a:latin typeface="ITC Avant Garde Pro Bk" panose="020B0502020202020204" pitchFamily="34" charset="0"/>
-              </a:rPr>
-              <a:t>Workshop</a:t>
-            </a:r>
-            <a:endParaRPr lang="en-NL" dirty="0">
-              <a:solidFill>
-                <a:schemeClr val="tx1"/>
-              </a:solidFill>
-              <a:latin typeface="ITC Avant Garde Pro Bk" panose="020B0502020202020204" pitchFamily="34" charset="0"/>
-            </a:endParaRPr>
-          </a:p>
-        </p:txBody>
-      </p:sp>
-    </p:spTree>
-    <p:extLst>
-      <p:ext uri="{BB962C8B-B14F-4D97-AF65-F5344CB8AC3E}">
-        <p14:creationId xmlns:p14="http://schemas.microsoft.com/office/powerpoint/2010/main" val="1216353968"/>
-      </p:ext>
-    </p:extLst>
-  </p:cSld>
-  <p:clrMapOvr>
-    <a:masterClrMapping/>
-  </p:clrMapOvr>
-</p:sld>
-</file>
-
-<file path=ppt/slides/slide7.xml><?xml version="1.0" encoding="utf-8"?>
+<file path=ppt/slides/slide8.xml><?xml version="1.0" encoding="utf-8"?>
 <p:sld xmlns:a="http://schemas.openxmlformats.org/drawingml/2006/main" xmlns:r="http://schemas.openxmlformats.org/officeDocument/2006/relationships" xmlns:p="http://schemas.openxmlformats.org/presentationml/2006/main">
   <p:cSld>
     <p:spTree>
@@ -24959,7 +25100,7 @@
 </p:sld>
 </file>
 
-<file path=ppt/slides/slide8.xml><?xml version="1.0" encoding="utf-8"?>
+<file path=ppt/slides/slide9.xml><?xml version="1.0" encoding="utf-8"?>
 <p:sld xmlns:a="http://schemas.openxmlformats.org/drawingml/2006/main" xmlns:r="http://schemas.openxmlformats.org/officeDocument/2006/relationships" xmlns:p="http://schemas.openxmlformats.org/presentationml/2006/main">
   <p:cSld>
     <p:spTree>
@@ -25168,147 +25309,6 @@
     <p:extLst>
       <p:ext uri="{BB962C8B-B14F-4D97-AF65-F5344CB8AC3E}">
         <p14:creationId xmlns:p14="http://schemas.microsoft.com/office/powerpoint/2010/main" val="1849438902"/>
-      </p:ext>
-    </p:extLst>
-  </p:cSld>
-  <p:clrMapOvr>
-    <a:masterClrMapping/>
-  </p:clrMapOvr>
-</p:sld>
-</file>
-
-<file path=ppt/slides/slide9.xml><?xml version="1.0" encoding="utf-8"?>
-<p:sld xmlns:a="http://schemas.openxmlformats.org/drawingml/2006/main" xmlns:r="http://schemas.openxmlformats.org/officeDocument/2006/relationships" xmlns:p="http://schemas.openxmlformats.org/presentationml/2006/main">
-  <p:cSld>
-    <p:bg>
-      <p:bgPr>
-        <a:solidFill>
-          <a:schemeClr val="bg1"/>
-        </a:solidFill>
-        <a:effectLst/>
-      </p:bgPr>
-    </p:bg>
-    <p:spTree>
-      <p:nvGrpSpPr>
-        <p:cNvPr id="1" name=""/>
-        <p:cNvGrpSpPr/>
-        <p:nvPr/>
-      </p:nvGrpSpPr>
-      <p:grpSpPr>
-        <a:xfrm>
-          <a:off x="0" y="0"/>
-          <a:ext cx="0" cy="0"/>
-          <a:chOff x="0" y="0"/>
-          <a:chExt cx="0" cy="0"/>
-        </a:xfrm>
-      </p:grpSpPr>
-      <p:sp>
-        <p:nvSpPr>
-          <p:cNvPr id="2" name="Title 1">
-            <a:extLst>
-              <a:ext uri="{FF2B5EF4-FFF2-40B4-BE49-F238E27FC236}">
-                <a16:creationId xmlns:a16="http://schemas.microsoft.com/office/drawing/2014/main" id="{1456509C-DE2D-E29A-0641-3ADFB676E85C}"/>
-              </a:ext>
-            </a:extLst>
-          </p:cNvPr>
-          <p:cNvSpPr>
-            <a:spLocks noGrp="1"/>
-          </p:cNvSpPr>
-          <p:nvPr>
-            <p:ph type="title"/>
-          </p:nvPr>
-        </p:nvSpPr>
-        <p:spPr>
-          <a:xfrm>
-            <a:off x="1154954" y="973669"/>
-            <a:ext cx="8825659" cy="706964"/>
-          </a:xfrm>
-        </p:spPr>
-        <p:txBody>
-          <a:bodyPr>
-            <a:normAutofit/>
-          </a:bodyPr>
-          <a:lstStyle/>
-          <a:p>
-            <a:r>
-              <a:rPr lang="en-GB" dirty="0"/>
-              <a:t>Git repository for these workshops</a:t>
-            </a:r>
-          </a:p>
-        </p:txBody>
-      </p:sp>
-      <p:sp>
-        <p:nvSpPr>
-          <p:cNvPr id="3" name="Content Placeholder 2">
-            <a:extLst>
-              <a:ext uri="{FF2B5EF4-FFF2-40B4-BE49-F238E27FC236}">
-                <a16:creationId xmlns:a16="http://schemas.microsoft.com/office/drawing/2014/main" id="{81E36EF8-C069-FFA9-CB2B-B4827089AB45}"/>
-              </a:ext>
-            </a:extLst>
-          </p:cNvPr>
-          <p:cNvSpPr>
-            <a:spLocks noGrp="1"/>
-          </p:cNvSpPr>
-          <p:nvPr>
-            <p:ph idx="1"/>
-          </p:nvPr>
-        </p:nvSpPr>
-        <p:spPr>
-          <a:xfrm>
-            <a:off x="5980954" y="2603500"/>
-            <a:ext cx="5211979" cy="3416300"/>
-          </a:xfrm>
-        </p:spPr>
-        <p:txBody>
-          <a:bodyPr anchor="ctr">
-            <a:normAutofit/>
-          </a:bodyPr>
-          <a:lstStyle/>
-          <a:p>
-            <a:r>
-              <a:rPr lang="en-GB" dirty="0"/>
-              <a:t>https://github.com/Rauleal/TouchDesigner_Bauhaus_workshop</a:t>
-            </a:r>
-          </a:p>
-          <a:p>
-            <a:endParaRPr lang="en-GB" dirty="0"/>
-          </a:p>
-        </p:txBody>
-      </p:sp>
-      <p:pic>
-        <p:nvPicPr>
-          <p:cNvPr id="6" name="Picture 5" descr="A qr code on a white background&#10;&#10;Description automatically generated">
-            <a:extLst>
-              <a:ext uri="{FF2B5EF4-FFF2-40B4-BE49-F238E27FC236}">
-                <a16:creationId xmlns:a16="http://schemas.microsoft.com/office/drawing/2014/main" id="{7F3F36FB-32F6-47C0-4108-C5CB112991F6}"/>
-              </a:ext>
-            </a:extLst>
-          </p:cNvPr>
-          <p:cNvPicPr>
-            <a:picLocks noChangeAspect="1"/>
-          </p:cNvPicPr>
-          <p:nvPr/>
-        </p:nvPicPr>
-        <p:blipFill>
-          <a:blip r:embed="rId2"/>
-          <a:stretch>
-            <a:fillRect/>
-          </a:stretch>
-        </p:blipFill>
-        <p:spPr>
-          <a:xfrm>
-            <a:off x="1660570" y="2696005"/>
-            <a:ext cx="3188326" cy="3188326"/>
-          </a:xfrm>
-          <a:prstGeom prst="rect">
-            <a:avLst/>
-          </a:prstGeom>
-        </p:spPr>
-      </p:pic>
-    </p:spTree>
-    <p:extLst>
-      <p:ext uri="{BB962C8B-B14F-4D97-AF65-F5344CB8AC3E}">
-        <p14:creationId xmlns:p14="http://schemas.microsoft.com/office/powerpoint/2010/main" val="22761770"/>
       </p:ext>
     </p:extLst>
   </p:cSld>

</xml_diff>